<commit_message>
updates lec 09, added dataset
</commit_message>
<xml_diff>
--- a/Syllabus/Lecture09/Lec09.pptx
+++ b/Syllabus/Lecture09/Lec09.pptx
@@ -23477,7 +23477,11 @@
             </a:pPr>
             <a:r>
               <a:rPr lang="en-US" dirty="0" err="1"/>
-              <a:t>h_t</a:t>
+              <a:t>h</a:t>
+            </a:r>
+            <a:r>
+              <a:rPr lang="en-US" baseline="-25000" dirty="0" err="1"/>
+              <a:t>t</a:t>
             </a:r>
             <a:r>
               <a:rPr lang="en-US" dirty="0"/>
@@ -24097,11 +24101,11 @@
             </a:r>
             <a:r>
               <a:rPr lang="en-US" dirty="0"/>
-              <a:t>, machinelearning</a:t>
-            </a:r>
-            <a:r>
-              <a:rPr lang="en-US"/>
-              <a:t>.com</a:t>
+              <a:t>, </a:t>
+            </a:r>
+            <a:r>
+              <a:rPr lang="en-US" dirty="0" err="1"/>
+              <a:t>machinelearning.com</a:t>
             </a:r>
             <a:endParaRPr lang="en-US" dirty="0"/>
           </a:p>

</xml_diff>